<commit_message>
Lab 2/28 : walk through of 2nd recursive function
</commit_message>
<xml_diff>
--- a/cs401_lab_2_28_20.pptx
+++ b/cs401_lab_2_28_20.pptx
@@ -5,10 +5,14 @@
     <p:sldMasterId id="2147483660" r:id="rId1"/>
   </p:sldMasterIdLst>
   <p:notesMasterIdLst>
-    <p:notesMasterId r:id="rId3"/>
+    <p:notesMasterId r:id="rId7"/>
   </p:notesMasterIdLst>
   <p:sldIdLst>
     <p:sldId id="256" r:id="rId2"/>
+    <p:sldId id="257" r:id="rId3"/>
+    <p:sldId id="258" r:id="rId4"/>
+    <p:sldId id="259" r:id="rId5"/>
+    <p:sldId id="260" r:id="rId6"/>
   </p:sldIdLst>
   <p:sldSz cx="9144000" cy="6858000" type="screen4x3"/>
   <p:notesSz cx="6858000" cy="9144000"/>
@@ -3481,10 +3485,23 @@
             </a:r>
           </a:p>
           <a:p>
-            <a:pPr lvl="1"/>
+            <a:pPr marL="914400" lvl="1" indent="-457200">
+              <a:buFont typeface="+mj-lt"/>
+              <a:buAutoNum type="arabicPeriod"/>
+            </a:pPr>
             <a:r>
               <a:rPr lang="en-US" sz="2400" dirty="0"/>
-              <a:t>- Open time for questions (about Project #5, any other course content…)</a:t>
+              <a:t>Trace of mystery2() method from Project #5</a:t>
+            </a:r>
+          </a:p>
+          <a:p>
+            <a:pPr marL="914400" lvl="1" indent="-457200">
+              <a:buFont typeface="+mj-lt"/>
+              <a:buAutoNum type="arabicPeriod"/>
+            </a:pPr>
+            <a:r>
+              <a:rPr lang="en-US" sz="2400" dirty="0"/>
+              <a:t>Open time to ask questions</a:t>
             </a:r>
           </a:p>
         </p:txBody>
@@ -3493,6 +3510,684 @@
     <p:extLst>
       <p:ext uri="{BB962C8B-B14F-4D97-AF65-F5344CB8AC3E}">
         <p14:creationId xmlns:p14="http://schemas.microsoft.com/office/powerpoint/2010/main" val="1594562380"/>
+      </p:ext>
+    </p:extLst>
+  </p:cSld>
+  <p:clrMapOvr>
+    <a:masterClrMapping/>
+  </p:clrMapOvr>
+</p:sld>
+</file>
+
+<file path=ppt/slides/slide2.xml><?xml version="1.0" encoding="utf-8"?>
+<p:sld xmlns:a="http://schemas.openxmlformats.org/drawingml/2006/main" xmlns:r="http://schemas.openxmlformats.org/officeDocument/2006/relationships" xmlns:p="http://schemas.openxmlformats.org/presentationml/2006/main">
+  <p:cSld>
+    <p:spTree>
+      <p:nvGrpSpPr>
+        <p:cNvPr id="1" name=""/>
+        <p:cNvGrpSpPr/>
+        <p:nvPr/>
+      </p:nvGrpSpPr>
+      <p:grpSpPr>
+        <a:xfrm>
+          <a:off x="0" y="0"/>
+          <a:ext cx="0" cy="0"/>
+          <a:chOff x="0" y="0"/>
+          <a:chExt cx="0" cy="0"/>
+        </a:xfrm>
+      </p:grpSpPr>
+      <p:sp>
+        <p:nvSpPr>
+          <p:cNvPr id="2" name="TextBox 1">
+            <a:extLst>
+              <a:ext uri="{FF2B5EF4-FFF2-40B4-BE49-F238E27FC236}">
+                <a16:creationId xmlns:a16="http://schemas.microsoft.com/office/drawing/2014/main" id="{75BCD752-A870-44FF-815E-531D48A12F00}"/>
+              </a:ext>
+            </a:extLst>
+          </p:cNvPr>
+          <p:cNvSpPr txBox="1"/>
+          <p:nvPr/>
+        </p:nvSpPr>
+        <p:spPr>
+          <a:xfrm>
+            <a:off x="0" y="0"/>
+            <a:ext cx="8134066" cy="523220"/>
+          </a:xfrm>
+          <a:prstGeom prst="rect">
+            <a:avLst/>
+          </a:prstGeom>
+        </p:spPr>
+        <p:txBody>
+          <a:bodyPr rtlCol="0">
+            <a:spAutoFit/>
+          </a:bodyPr>
+          <a:lstStyle/>
+          <a:p>
+            <a:r>
+              <a:rPr lang="en-US" sz="2800" dirty="0">
+                <a:solidFill>
+                  <a:srgbClr val="002060"/>
+                </a:solidFill>
+              </a:rPr>
+              <a:t>From the posted code sample:</a:t>
+            </a:r>
+          </a:p>
+        </p:txBody>
+      </p:sp>
+      <p:pic>
+        <p:nvPicPr>
+          <p:cNvPr id="7" name="Picture 6" descr="A screenshot of a computer screen&#10;&#10;Description automatically generated">
+            <a:extLst>
+              <a:ext uri="{FF2B5EF4-FFF2-40B4-BE49-F238E27FC236}">
+                <a16:creationId xmlns:a16="http://schemas.microsoft.com/office/drawing/2014/main" id="{32347B15-6181-42A5-9F39-1DB84806B4B8}"/>
+              </a:ext>
+            </a:extLst>
+          </p:cNvPr>
+          <p:cNvPicPr>
+            <a:picLocks noChangeAspect="1"/>
+          </p:cNvPicPr>
+          <p:nvPr/>
+        </p:nvPicPr>
+        <p:blipFill rotWithShape="1">
+          <a:blip r:embed="rId2">
+            <a:extLst>
+              <a:ext uri="{28A0092B-C50C-407E-A947-70E740481C1C}">
+                <a14:useLocalDpi xmlns:a14="http://schemas.microsoft.com/office/drawing/2010/main" val="0"/>
+              </a:ext>
+            </a:extLst>
+          </a:blip>
+          <a:srcRect l="13611" t="35686" r="47981" b="59878"/>
+          <a:stretch/>
+        </p:blipFill>
+        <p:spPr>
+          <a:xfrm>
+            <a:off x="498764" y="723689"/>
+            <a:ext cx="4813247" cy="373991"/>
+          </a:xfrm>
+          <a:prstGeom prst="rect">
+            <a:avLst/>
+          </a:prstGeom>
+        </p:spPr>
+      </p:pic>
+      <p:pic>
+        <p:nvPicPr>
+          <p:cNvPr id="8" name="Picture 7" descr="A screenshot of a computer screen&#10;&#10;Description automatically generated">
+            <a:extLst>
+              <a:ext uri="{FF2B5EF4-FFF2-40B4-BE49-F238E27FC236}">
+                <a16:creationId xmlns:a16="http://schemas.microsoft.com/office/drawing/2014/main" id="{2993FA88-F75E-4831-99AD-0BE651234284}"/>
+              </a:ext>
+            </a:extLst>
+          </p:cNvPr>
+          <p:cNvPicPr>
+            <a:picLocks noChangeAspect="1"/>
+          </p:cNvPicPr>
+          <p:nvPr/>
+        </p:nvPicPr>
+        <p:blipFill rotWithShape="1">
+          <a:blip r:embed="rId2">
+            <a:extLst>
+              <a:ext uri="{28A0092B-C50C-407E-A947-70E740481C1C}">
+                <a14:useLocalDpi xmlns:a14="http://schemas.microsoft.com/office/drawing/2010/main" val="0"/>
+              </a:ext>
+            </a:extLst>
+          </a:blip>
+          <a:srcRect l="8945" t="62131" r="49407" b="22234"/>
+          <a:stretch/>
+        </p:blipFill>
+        <p:spPr>
+          <a:xfrm>
+            <a:off x="498764" y="1448789"/>
+            <a:ext cx="5219280" cy="1318162"/>
+          </a:xfrm>
+          <a:prstGeom prst="rect">
+            <a:avLst/>
+          </a:prstGeom>
+        </p:spPr>
+      </p:pic>
+      <p:sp>
+        <p:nvSpPr>
+          <p:cNvPr id="9" name="TextBox 8">
+            <a:extLst>
+              <a:ext uri="{FF2B5EF4-FFF2-40B4-BE49-F238E27FC236}">
+                <a16:creationId xmlns:a16="http://schemas.microsoft.com/office/drawing/2014/main" id="{50AB53A2-58A8-458E-8224-D283665B18EB}"/>
+              </a:ext>
+            </a:extLst>
+          </p:cNvPr>
+          <p:cNvSpPr txBox="1"/>
+          <p:nvPr/>
+        </p:nvSpPr>
+        <p:spPr>
+          <a:xfrm>
+            <a:off x="543067" y="3546680"/>
+            <a:ext cx="8134066" cy="2708434"/>
+          </a:xfrm>
+          <a:prstGeom prst="rect">
+            <a:avLst/>
+          </a:prstGeom>
+        </p:spPr>
+        <p:txBody>
+          <a:bodyPr rtlCol="0">
+            <a:spAutoFit/>
+          </a:bodyPr>
+          <a:lstStyle/>
+          <a:p>
+            <a:r>
+              <a:rPr lang="en-US" sz="2400" u="sng" dirty="0"/>
+              <a:t>Anticipating the outcome:</a:t>
+            </a:r>
+          </a:p>
+          <a:p>
+            <a:r>
+              <a:rPr lang="en-US" sz="2400" dirty="0"/>
+              <a:t>-This will print out </a:t>
+            </a:r>
+            <a:r>
+              <a:rPr lang="en-US" sz="2400" i="1" dirty="0"/>
+              <a:t>23</a:t>
+            </a:r>
+            <a:r>
+              <a:rPr lang="en-US" sz="2400" dirty="0"/>
+              <a:t>.</a:t>
+            </a:r>
+          </a:p>
+          <a:p>
+            <a:r>
+              <a:rPr lang="en-US" sz="2400" dirty="0"/>
+              <a:t>-It is taking the sum of the digits in the number.</a:t>
+            </a:r>
+          </a:p>
+          <a:p>
+            <a:r>
+              <a:rPr lang="en-US" sz="2400" dirty="0"/>
+              <a:t>-</a:t>
+            </a:r>
+            <a:r>
+              <a:rPr lang="en-US" sz="2400" u="sng" dirty="0"/>
+              <a:t>More importantly</a:t>
+            </a:r>
+            <a:r>
+              <a:rPr lang="en-US" sz="2400" dirty="0"/>
+              <a:t>: How does this happen?  How can we trace through this code, or any recursive code, to anticipate this outcome?</a:t>
+            </a:r>
+          </a:p>
+          <a:p>
+            <a:endParaRPr lang="en-US" sz="2600" u="sng" dirty="0">
+              <a:solidFill>
+                <a:srgbClr val="002060"/>
+              </a:solidFill>
+            </a:endParaRPr>
+          </a:p>
+        </p:txBody>
+      </p:sp>
+    </p:spTree>
+    <p:extLst>
+      <p:ext uri="{BB962C8B-B14F-4D97-AF65-F5344CB8AC3E}">
+        <p14:creationId xmlns:p14="http://schemas.microsoft.com/office/powerpoint/2010/main" val="1578244790"/>
+      </p:ext>
+    </p:extLst>
+  </p:cSld>
+  <p:clrMapOvr>
+    <a:masterClrMapping/>
+  </p:clrMapOvr>
+</p:sld>
+</file>
+
+<file path=ppt/slides/slide3.xml><?xml version="1.0" encoding="utf-8"?>
+<p:sld xmlns:a="http://schemas.openxmlformats.org/drawingml/2006/main" xmlns:r="http://schemas.openxmlformats.org/officeDocument/2006/relationships" xmlns:p="http://schemas.openxmlformats.org/presentationml/2006/main">
+  <p:cSld>
+    <p:spTree>
+      <p:nvGrpSpPr>
+        <p:cNvPr id="1" name=""/>
+        <p:cNvGrpSpPr/>
+        <p:nvPr/>
+      </p:nvGrpSpPr>
+      <p:grpSpPr>
+        <a:xfrm>
+          <a:off x="0" y="0"/>
+          <a:ext cx="0" cy="0"/>
+          <a:chOff x="0" y="0"/>
+          <a:chExt cx="0" cy="0"/>
+        </a:xfrm>
+      </p:grpSpPr>
+      <p:sp>
+        <p:nvSpPr>
+          <p:cNvPr id="2" name="TextBox 1">
+            <a:extLst>
+              <a:ext uri="{FF2B5EF4-FFF2-40B4-BE49-F238E27FC236}">
+                <a16:creationId xmlns:a16="http://schemas.microsoft.com/office/drawing/2014/main" id="{75BCD752-A870-44FF-815E-531D48A12F00}"/>
+              </a:ext>
+            </a:extLst>
+          </p:cNvPr>
+          <p:cNvSpPr txBox="1"/>
+          <p:nvPr/>
+        </p:nvSpPr>
+        <p:spPr>
+          <a:xfrm>
+            <a:off x="0" y="0"/>
+            <a:ext cx="8134066" cy="523220"/>
+          </a:xfrm>
+          <a:prstGeom prst="rect">
+            <a:avLst/>
+          </a:prstGeom>
+        </p:spPr>
+        <p:txBody>
+          <a:bodyPr rtlCol="0">
+            <a:spAutoFit/>
+          </a:bodyPr>
+          <a:lstStyle/>
+          <a:p>
+            <a:r>
+              <a:rPr lang="en-US" sz="2800" dirty="0">
+                <a:solidFill>
+                  <a:srgbClr val="002060"/>
+                </a:solidFill>
+              </a:rPr>
+              <a:t>From the posted code sample:</a:t>
+            </a:r>
+          </a:p>
+        </p:txBody>
+      </p:sp>
+      <p:pic>
+        <p:nvPicPr>
+          <p:cNvPr id="7" name="Picture 6" descr="A screenshot of a computer screen&#10;&#10;Description automatically generated">
+            <a:extLst>
+              <a:ext uri="{FF2B5EF4-FFF2-40B4-BE49-F238E27FC236}">
+                <a16:creationId xmlns:a16="http://schemas.microsoft.com/office/drawing/2014/main" id="{32347B15-6181-42A5-9F39-1DB84806B4B8}"/>
+              </a:ext>
+            </a:extLst>
+          </p:cNvPr>
+          <p:cNvPicPr>
+            <a:picLocks noChangeAspect="1"/>
+          </p:cNvPicPr>
+          <p:nvPr/>
+        </p:nvPicPr>
+        <p:blipFill rotWithShape="1">
+          <a:blip r:embed="rId2">
+            <a:extLst>
+              <a:ext uri="{28A0092B-C50C-407E-A947-70E740481C1C}">
+                <a14:useLocalDpi xmlns:a14="http://schemas.microsoft.com/office/drawing/2010/main" val="0"/>
+              </a:ext>
+            </a:extLst>
+          </a:blip>
+          <a:srcRect l="13611" t="35686" r="47981" b="59878"/>
+          <a:stretch/>
+        </p:blipFill>
+        <p:spPr>
+          <a:xfrm>
+            <a:off x="498764" y="723689"/>
+            <a:ext cx="4813247" cy="373991"/>
+          </a:xfrm>
+          <a:prstGeom prst="rect">
+            <a:avLst/>
+          </a:prstGeom>
+        </p:spPr>
+      </p:pic>
+      <p:sp>
+        <p:nvSpPr>
+          <p:cNvPr id="9" name="TextBox 8">
+            <a:extLst>
+              <a:ext uri="{FF2B5EF4-FFF2-40B4-BE49-F238E27FC236}">
+                <a16:creationId xmlns:a16="http://schemas.microsoft.com/office/drawing/2014/main" id="{50AB53A2-58A8-458E-8224-D283665B18EB}"/>
+              </a:ext>
+            </a:extLst>
+          </p:cNvPr>
+          <p:cNvSpPr txBox="1"/>
+          <p:nvPr/>
+        </p:nvSpPr>
+        <p:spPr>
+          <a:xfrm>
+            <a:off x="543067" y="3546680"/>
+            <a:ext cx="8134066" cy="3200876"/>
+          </a:xfrm>
+          <a:prstGeom prst="rect">
+            <a:avLst/>
+          </a:prstGeom>
+        </p:spPr>
+        <p:txBody>
+          <a:bodyPr rtlCol="0">
+            <a:spAutoFit/>
+          </a:bodyPr>
+          <a:lstStyle/>
+          <a:p>
+            <a:r>
+              <a:rPr lang="en-US" sz="2200" u="sng" dirty="0"/>
+              <a:t>General pointers:</a:t>
+            </a:r>
+          </a:p>
+          <a:p>
+            <a:r>
+              <a:rPr lang="en-US" sz="2000" dirty="0"/>
+              <a:t>--It helps to draw out the individual method calls as a stack (illustrated later), and keep track of the parameter values (here, just </a:t>
+            </a:r>
+            <a:r>
+              <a:rPr lang="en-US" sz="2000" i="1" dirty="0"/>
+              <a:t>n</a:t>
+            </a:r>
+            <a:r>
+              <a:rPr lang="en-US" sz="2000" dirty="0"/>
+              <a:t>) for each layer of the stack</a:t>
+            </a:r>
+          </a:p>
+          <a:p>
+            <a:r>
+              <a:rPr lang="en-US" sz="2000" dirty="0"/>
+              <a:t>--Convention is to draw the stack growing upwards.  When individual method calls return, the call is popped off the top of the stack (for more background, see </a:t>
+            </a:r>
+            <a:r>
+              <a:rPr lang="en-US" sz="2000" dirty="0">
+                <a:hlinkClick r:id="rId3"/>
+              </a:rPr>
+              <a:t>https://en.wikipedia.org/wiki/Stack_(abstract_data_type)</a:t>
+            </a:r>
+            <a:r>
+              <a:rPr lang="en-US" sz="2000" dirty="0"/>
+              <a:t>)</a:t>
+            </a:r>
+          </a:p>
+          <a:p>
+            <a:r>
+              <a:rPr lang="en-US" sz="2000" dirty="0"/>
+              <a:t>--Remember that for statements involving the </a:t>
+            </a:r>
+            <a:r>
+              <a:rPr lang="en-US" sz="2000" i="1" dirty="0"/>
+              <a:t>return</a:t>
+            </a:r>
+            <a:r>
+              <a:rPr lang="en-US" sz="2000" dirty="0"/>
+              <a:t> keyword, any method calls on the right hand side must be processed first.</a:t>
+            </a:r>
+          </a:p>
+          <a:p>
+            <a:endParaRPr lang="en-US" sz="2000" u="sng" dirty="0"/>
+          </a:p>
+        </p:txBody>
+      </p:sp>
+      <p:pic>
+        <p:nvPicPr>
+          <p:cNvPr id="6" name="Picture 5" descr="A screenshot of a computer screen&#10;&#10;Description automatically generated">
+            <a:extLst>
+              <a:ext uri="{FF2B5EF4-FFF2-40B4-BE49-F238E27FC236}">
+                <a16:creationId xmlns:a16="http://schemas.microsoft.com/office/drawing/2014/main" id="{71FB2519-FF4E-4D4A-B07F-A108AF6E8DEE}"/>
+              </a:ext>
+            </a:extLst>
+          </p:cNvPr>
+          <p:cNvPicPr>
+            <a:picLocks noChangeAspect="1"/>
+          </p:cNvPicPr>
+          <p:nvPr/>
+        </p:nvPicPr>
+        <p:blipFill rotWithShape="1">
+          <a:blip r:embed="rId2">
+            <a:extLst>
+              <a:ext uri="{28A0092B-C50C-407E-A947-70E740481C1C}">
+                <a14:useLocalDpi xmlns:a14="http://schemas.microsoft.com/office/drawing/2010/main" val="0"/>
+              </a:ext>
+            </a:extLst>
+          </a:blip>
+          <a:srcRect l="8945" t="62131" r="49407" b="22234"/>
+          <a:stretch/>
+        </p:blipFill>
+        <p:spPr>
+          <a:xfrm>
+            <a:off x="498764" y="1448789"/>
+            <a:ext cx="5219280" cy="1318162"/>
+          </a:xfrm>
+          <a:prstGeom prst="rect">
+            <a:avLst/>
+          </a:prstGeom>
+        </p:spPr>
+      </p:pic>
+    </p:spTree>
+    <p:extLst>
+      <p:ext uri="{BB962C8B-B14F-4D97-AF65-F5344CB8AC3E}">
+        <p14:creationId xmlns:p14="http://schemas.microsoft.com/office/powerpoint/2010/main" val="3401976715"/>
+      </p:ext>
+    </p:extLst>
+  </p:cSld>
+  <p:clrMapOvr>
+    <a:masterClrMapping/>
+  </p:clrMapOvr>
+</p:sld>
+</file>
+
+<file path=ppt/slides/slide4.xml><?xml version="1.0" encoding="utf-8"?>
+<p:sld xmlns:a="http://schemas.openxmlformats.org/drawingml/2006/main" xmlns:r="http://schemas.openxmlformats.org/officeDocument/2006/relationships" xmlns:p="http://schemas.openxmlformats.org/presentationml/2006/main">
+  <p:cSld>
+    <p:spTree>
+      <p:nvGrpSpPr>
+        <p:cNvPr id="1" name=""/>
+        <p:cNvGrpSpPr/>
+        <p:nvPr/>
+      </p:nvGrpSpPr>
+      <p:grpSpPr>
+        <a:xfrm>
+          <a:off x="0" y="0"/>
+          <a:ext cx="0" cy="0"/>
+          <a:chOff x="0" y="0"/>
+          <a:chExt cx="0" cy="0"/>
+        </a:xfrm>
+      </p:grpSpPr>
+      <p:sp>
+        <p:nvSpPr>
+          <p:cNvPr id="2" name="TextBox 1">
+            <a:extLst>
+              <a:ext uri="{FF2B5EF4-FFF2-40B4-BE49-F238E27FC236}">
+                <a16:creationId xmlns:a16="http://schemas.microsoft.com/office/drawing/2014/main" id="{75BCD752-A870-44FF-815E-531D48A12F00}"/>
+              </a:ext>
+            </a:extLst>
+          </p:cNvPr>
+          <p:cNvSpPr txBox="1"/>
+          <p:nvPr/>
+        </p:nvSpPr>
+        <p:spPr>
+          <a:xfrm>
+            <a:off x="0" y="0"/>
+            <a:ext cx="8134066" cy="523220"/>
+          </a:xfrm>
+          <a:prstGeom prst="rect">
+            <a:avLst/>
+          </a:prstGeom>
+        </p:spPr>
+        <p:txBody>
+          <a:bodyPr rtlCol="0">
+            <a:spAutoFit/>
+          </a:bodyPr>
+          <a:lstStyle/>
+          <a:p>
+            <a:r>
+              <a:rPr lang="en-US" sz="2800" dirty="0">
+                <a:solidFill>
+                  <a:srgbClr val="002060"/>
+                </a:solidFill>
+              </a:rPr>
+              <a:t>From the posted code sample:</a:t>
+            </a:r>
+          </a:p>
+        </p:txBody>
+      </p:sp>
+      <p:pic>
+        <p:nvPicPr>
+          <p:cNvPr id="7" name="Picture 6" descr="A screenshot of a computer screen&#10;&#10;Description automatically generated">
+            <a:extLst>
+              <a:ext uri="{FF2B5EF4-FFF2-40B4-BE49-F238E27FC236}">
+                <a16:creationId xmlns:a16="http://schemas.microsoft.com/office/drawing/2014/main" id="{32347B15-6181-42A5-9F39-1DB84806B4B8}"/>
+              </a:ext>
+            </a:extLst>
+          </p:cNvPr>
+          <p:cNvPicPr>
+            <a:picLocks noChangeAspect="1"/>
+          </p:cNvPicPr>
+          <p:nvPr/>
+        </p:nvPicPr>
+        <p:blipFill rotWithShape="1">
+          <a:blip r:embed="rId2">
+            <a:extLst>
+              <a:ext uri="{28A0092B-C50C-407E-A947-70E740481C1C}">
+                <a14:useLocalDpi xmlns:a14="http://schemas.microsoft.com/office/drawing/2010/main" val="0"/>
+              </a:ext>
+            </a:extLst>
+          </a:blip>
+          <a:srcRect l="13611" t="35686" r="47981" b="59878"/>
+          <a:stretch/>
+        </p:blipFill>
+        <p:spPr>
+          <a:xfrm>
+            <a:off x="498764" y="723689"/>
+            <a:ext cx="4813247" cy="373991"/>
+          </a:xfrm>
+          <a:prstGeom prst="rect">
+            <a:avLst/>
+          </a:prstGeom>
+        </p:spPr>
+      </p:pic>
+      <p:sp>
+        <p:nvSpPr>
+          <p:cNvPr id="9" name="TextBox 8">
+            <a:extLst>
+              <a:ext uri="{FF2B5EF4-FFF2-40B4-BE49-F238E27FC236}">
+                <a16:creationId xmlns:a16="http://schemas.microsoft.com/office/drawing/2014/main" id="{50AB53A2-58A8-458E-8224-D283665B18EB}"/>
+              </a:ext>
+            </a:extLst>
+          </p:cNvPr>
+          <p:cNvSpPr txBox="1"/>
+          <p:nvPr/>
+        </p:nvSpPr>
+        <p:spPr>
+          <a:xfrm>
+            <a:off x="543067" y="3546680"/>
+            <a:ext cx="8134066" cy="1046440"/>
+          </a:xfrm>
+          <a:prstGeom prst="rect">
+            <a:avLst/>
+          </a:prstGeom>
+        </p:spPr>
+        <p:txBody>
+          <a:bodyPr rtlCol="0">
+            <a:spAutoFit/>
+          </a:bodyPr>
+          <a:lstStyle/>
+          <a:p>
+            <a:r>
+              <a:rPr lang="en-US" sz="2200" u="sng" dirty="0"/>
+              <a:t>Tracing:</a:t>
+            </a:r>
+          </a:p>
+          <a:p>
+            <a:r>
+              <a:rPr lang="en-US" sz="2000" dirty="0"/>
+              <a:t>--On the board: illustration of calling mystery2 with a smaller number (789, expected to return 24)</a:t>
+            </a:r>
+          </a:p>
+        </p:txBody>
+      </p:sp>
+      <p:pic>
+        <p:nvPicPr>
+          <p:cNvPr id="6" name="Picture 5" descr="A screenshot of a computer screen&#10;&#10;Description automatically generated">
+            <a:extLst>
+              <a:ext uri="{FF2B5EF4-FFF2-40B4-BE49-F238E27FC236}">
+                <a16:creationId xmlns:a16="http://schemas.microsoft.com/office/drawing/2014/main" id="{7F094520-9D29-439B-B947-D648DFDD8C64}"/>
+              </a:ext>
+            </a:extLst>
+          </p:cNvPr>
+          <p:cNvPicPr>
+            <a:picLocks noChangeAspect="1"/>
+          </p:cNvPicPr>
+          <p:nvPr/>
+        </p:nvPicPr>
+        <p:blipFill rotWithShape="1">
+          <a:blip r:embed="rId2">
+            <a:extLst>
+              <a:ext uri="{28A0092B-C50C-407E-A947-70E740481C1C}">
+                <a14:useLocalDpi xmlns:a14="http://schemas.microsoft.com/office/drawing/2010/main" val="0"/>
+              </a:ext>
+            </a:extLst>
+          </a:blip>
+          <a:srcRect l="8945" t="62131" r="49407" b="22234"/>
+          <a:stretch/>
+        </p:blipFill>
+        <p:spPr>
+          <a:xfrm>
+            <a:off x="543067" y="1484415"/>
+            <a:ext cx="5219280" cy="1318162"/>
+          </a:xfrm>
+          <a:prstGeom prst="rect">
+            <a:avLst/>
+          </a:prstGeom>
+        </p:spPr>
+      </p:pic>
+    </p:spTree>
+    <p:extLst>
+      <p:ext uri="{BB962C8B-B14F-4D97-AF65-F5344CB8AC3E}">
+        <p14:creationId xmlns:p14="http://schemas.microsoft.com/office/powerpoint/2010/main" val="4028270410"/>
+      </p:ext>
+    </p:extLst>
+  </p:cSld>
+  <p:clrMapOvr>
+    <a:masterClrMapping/>
+  </p:clrMapOvr>
+</p:sld>
+</file>
+
+<file path=ppt/slides/slide5.xml><?xml version="1.0" encoding="utf-8"?>
+<p:sld xmlns:a="http://schemas.openxmlformats.org/drawingml/2006/main" xmlns:r="http://schemas.openxmlformats.org/officeDocument/2006/relationships" xmlns:p="http://schemas.openxmlformats.org/presentationml/2006/main">
+  <p:cSld>
+    <p:spTree>
+      <p:nvGrpSpPr>
+        <p:cNvPr id="1" name=""/>
+        <p:cNvGrpSpPr/>
+        <p:nvPr/>
+      </p:nvGrpSpPr>
+      <p:grpSpPr>
+        <a:xfrm>
+          <a:off x="0" y="0"/>
+          <a:ext cx="0" cy="0"/>
+          <a:chOff x="0" y="0"/>
+          <a:chExt cx="0" cy="0"/>
+        </a:xfrm>
+      </p:grpSpPr>
+      <p:sp>
+        <p:nvSpPr>
+          <p:cNvPr id="2" name="TextBox 1">
+            <a:extLst>
+              <a:ext uri="{FF2B5EF4-FFF2-40B4-BE49-F238E27FC236}">
+                <a16:creationId xmlns:a16="http://schemas.microsoft.com/office/drawing/2014/main" id="{75BCD752-A870-44FF-815E-531D48A12F00}"/>
+              </a:ext>
+            </a:extLst>
+          </p:cNvPr>
+          <p:cNvSpPr txBox="1"/>
+          <p:nvPr/>
+        </p:nvSpPr>
+        <p:spPr>
+          <a:xfrm>
+            <a:off x="0" y="0"/>
+            <a:ext cx="8134066" cy="523220"/>
+          </a:xfrm>
+          <a:prstGeom prst="rect">
+            <a:avLst/>
+          </a:prstGeom>
+        </p:spPr>
+        <p:txBody>
+          <a:bodyPr rtlCol="0">
+            <a:spAutoFit/>
+          </a:bodyPr>
+          <a:lstStyle/>
+          <a:p>
+            <a:r>
+              <a:rPr lang="en-US" sz="2800" dirty="0">
+                <a:solidFill>
+                  <a:srgbClr val="002060"/>
+                </a:solidFill>
+              </a:rPr>
+              <a:t>Image of trace on whiteboard (will be posted later):</a:t>
+            </a:r>
+          </a:p>
+        </p:txBody>
+      </p:sp>
+    </p:spTree>
+    <p:extLst>
+      <p:ext uri="{BB962C8B-B14F-4D97-AF65-F5344CB8AC3E}">
+        <p14:creationId xmlns:p14="http://schemas.microsoft.com/office/powerpoint/2010/main" val="726952055"/>
       </p:ext>
     </p:extLst>
   </p:cSld>

</xml_diff>

<commit_message>
Lab 3/2/20 walk through of 2nd recursive function - added whiteboard images
</commit_message>
<xml_diff>
--- a/cs401_lab_2_28_20.pptx
+++ b/cs401_lab_2_28_20.pptx
@@ -5,14 +5,15 @@
     <p:sldMasterId id="2147483660" r:id="rId1"/>
   </p:sldMasterIdLst>
   <p:notesMasterIdLst>
-    <p:notesMasterId r:id="rId7"/>
+    <p:notesMasterId r:id="rId8"/>
   </p:notesMasterIdLst>
   <p:sldIdLst>
     <p:sldId id="256" r:id="rId2"/>
     <p:sldId id="257" r:id="rId3"/>
     <p:sldId id="258" r:id="rId4"/>
     <p:sldId id="259" r:id="rId5"/>
-    <p:sldId id="260" r:id="rId6"/>
+    <p:sldId id="261" r:id="rId6"/>
+    <p:sldId id="260" r:id="rId7"/>
   </p:sldIdLst>
   <p:sldSz cx="9144000" cy="6858000" type="screen4x3"/>
   <p:notesSz cx="6858000" cy="9144000"/>
@@ -212,7 +213,7 @@
           <a:p>
             <a:fld id="{95A4384D-C0A9-48C5-B94B-43CB0E0C0E08}" type="datetimeFigureOut">
               <a:rPr lang="en-US" smtClean="0"/>
-              <a:t>2/28/2020</a:t>
+              <a:t>3/2/2020</a:t>
             </a:fld>
             <a:endParaRPr lang="en-US"/>
           </a:p>
@@ -610,7 +611,7 @@
           <a:p>
             <a:fld id="{331D76CF-5E7C-420B-89A3-7189BACB8345}" type="datetimeFigureOut">
               <a:rPr lang="en-US" smtClean="0"/>
-              <a:t>2/28/2020</a:t>
+              <a:t>3/2/2020</a:t>
             </a:fld>
             <a:endParaRPr lang="en-US"/>
           </a:p>
@@ -780,7 +781,7 @@
           <a:p>
             <a:fld id="{331D76CF-5E7C-420B-89A3-7189BACB8345}" type="datetimeFigureOut">
               <a:rPr lang="en-US" smtClean="0"/>
-              <a:t>2/28/2020</a:t>
+              <a:t>3/2/2020</a:t>
             </a:fld>
             <a:endParaRPr lang="en-US"/>
           </a:p>
@@ -960,7 +961,7 @@
           <a:p>
             <a:fld id="{331D76CF-5E7C-420B-89A3-7189BACB8345}" type="datetimeFigureOut">
               <a:rPr lang="en-US" smtClean="0"/>
-              <a:t>2/28/2020</a:t>
+              <a:t>3/2/2020</a:t>
             </a:fld>
             <a:endParaRPr lang="en-US"/>
           </a:p>
@@ -1130,7 +1131,7 @@
           <a:p>
             <a:fld id="{331D76CF-5E7C-420B-89A3-7189BACB8345}" type="datetimeFigureOut">
               <a:rPr lang="en-US" smtClean="0"/>
-              <a:t>2/28/2020</a:t>
+              <a:t>3/2/2020</a:t>
             </a:fld>
             <a:endParaRPr lang="en-US"/>
           </a:p>
@@ -1374,7 +1375,7 @@
           <a:p>
             <a:fld id="{331D76CF-5E7C-420B-89A3-7189BACB8345}" type="datetimeFigureOut">
               <a:rPr lang="en-US" smtClean="0"/>
-              <a:t>2/28/2020</a:t>
+              <a:t>3/2/2020</a:t>
             </a:fld>
             <a:endParaRPr lang="en-US"/>
           </a:p>
@@ -1606,7 +1607,7 @@
           <a:p>
             <a:fld id="{331D76CF-5E7C-420B-89A3-7189BACB8345}" type="datetimeFigureOut">
               <a:rPr lang="en-US" smtClean="0"/>
-              <a:t>2/28/2020</a:t>
+              <a:t>3/2/2020</a:t>
             </a:fld>
             <a:endParaRPr lang="en-US"/>
           </a:p>
@@ -1973,7 +1974,7 @@
           <a:p>
             <a:fld id="{331D76CF-5E7C-420B-89A3-7189BACB8345}" type="datetimeFigureOut">
               <a:rPr lang="en-US" smtClean="0"/>
-              <a:t>2/28/2020</a:t>
+              <a:t>3/2/2020</a:t>
             </a:fld>
             <a:endParaRPr lang="en-US"/>
           </a:p>
@@ -2091,7 +2092,7 @@
           <a:p>
             <a:fld id="{331D76CF-5E7C-420B-89A3-7189BACB8345}" type="datetimeFigureOut">
               <a:rPr lang="en-US" smtClean="0"/>
-              <a:t>2/28/2020</a:t>
+              <a:t>3/2/2020</a:t>
             </a:fld>
             <a:endParaRPr lang="en-US"/>
           </a:p>
@@ -2186,7 +2187,7 @@
           <a:p>
             <a:fld id="{331D76CF-5E7C-420B-89A3-7189BACB8345}" type="datetimeFigureOut">
               <a:rPr lang="en-US" smtClean="0"/>
-              <a:t>2/28/2020</a:t>
+              <a:t>3/2/2020</a:t>
             </a:fld>
             <a:endParaRPr lang="en-US"/>
           </a:p>
@@ -2463,7 +2464,7 @@
           <a:p>
             <a:fld id="{331D76CF-5E7C-420B-89A3-7189BACB8345}" type="datetimeFigureOut">
               <a:rPr lang="en-US" smtClean="0"/>
-              <a:t>2/28/2020</a:t>
+              <a:t>3/2/2020</a:t>
             </a:fld>
             <a:endParaRPr lang="en-US"/>
           </a:p>
@@ -2720,7 +2721,7 @@
           <a:p>
             <a:fld id="{331D76CF-5E7C-420B-89A3-7189BACB8345}" type="datetimeFigureOut">
               <a:rPr lang="en-US" smtClean="0"/>
-              <a:t>2/28/2020</a:t>
+              <a:t>3/2/2020</a:t>
             </a:fld>
             <a:endParaRPr lang="en-US"/>
           </a:p>
@@ -2933,7 +2934,7 @@
           <a:p>
             <a:fld id="{331D76CF-5E7C-420B-89A3-7189BACB8345}" type="datetimeFigureOut">
               <a:rPr lang="en-US" smtClean="0"/>
-              <a:t>2/28/2020</a:t>
+              <a:t>3/2/2020</a:t>
             </a:fld>
             <a:endParaRPr lang="en-US"/>
           </a:p>
@@ -3343,7 +3344,7 @@
           <p:cNvPr id="4" name="TextBox 3">
             <a:extLst>
               <a:ext uri="{FF2B5EF4-FFF2-40B4-BE49-F238E27FC236}">
-                <a16:creationId xmlns:a16="http://schemas.microsoft.com/office/drawing/2014/main" id="{8A67A37A-C488-40D7-A088-6774405888BB}"/>
+                <a16:creationId xmlns:a16="http://schemas.microsoft.com/office/drawing/2014/main" xmlns="" id="{8A67A37A-C488-40D7-A088-6774405888BB}"/>
               </a:ext>
             </a:extLst>
           </p:cNvPr>
@@ -3381,7 +3382,7 @@
           <p:cNvPr id="5" name="TextBox 4">
             <a:extLst>
               <a:ext uri="{FF2B5EF4-FFF2-40B4-BE49-F238E27FC236}">
-                <a16:creationId xmlns:a16="http://schemas.microsoft.com/office/drawing/2014/main" id="{EC931DCA-4690-4B93-9419-BA902293A61A}"/>
+                <a16:creationId xmlns:a16="http://schemas.microsoft.com/office/drawing/2014/main" xmlns="" id="{EC931DCA-4690-4B93-9419-BA902293A61A}"/>
               </a:ext>
             </a:extLst>
           </p:cNvPr>
@@ -3432,7 +3433,7 @@
           <p:cNvPr id="6" name="TextBox 5">
             <a:extLst>
               <a:ext uri="{FF2B5EF4-FFF2-40B4-BE49-F238E27FC236}">
-                <a16:creationId xmlns:a16="http://schemas.microsoft.com/office/drawing/2014/main" id="{69482C66-1608-4A0B-97A3-D6148119A6E2}"/>
+                <a16:creationId xmlns:a16="http://schemas.microsoft.com/office/drawing/2014/main" xmlns="" id="{69482C66-1608-4A0B-97A3-D6148119A6E2}"/>
               </a:ext>
             </a:extLst>
           </p:cNvPr>
@@ -3541,7 +3542,7 @@
           <p:cNvPr id="2" name="TextBox 1">
             <a:extLst>
               <a:ext uri="{FF2B5EF4-FFF2-40B4-BE49-F238E27FC236}">
-                <a16:creationId xmlns:a16="http://schemas.microsoft.com/office/drawing/2014/main" id="{75BCD752-A870-44FF-815E-531D48A12F00}"/>
+                <a16:creationId xmlns:a16="http://schemas.microsoft.com/office/drawing/2014/main" xmlns="" id="{75BCD752-A870-44FF-815E-531D48A12F00}"/>
               </a:ext>
             </a:extLst>
           </p:cNvPr>
@@ -3579,7 +3580,7 @@
           <p:cNvPr id="7" name="Picture 6" descr="A screenshot of a computer screen&#10;&#10;Description automatically generated">
             <a:extLst>
               <a:ext uri="{FF2B5EF4-FFF2-40B4-BE49-F238E27FC236}">
-                <a16:creationId xmlns:a16="http://schemas.microsoft.com/office/drawing/2014/main" id="{32347B15-6181-42A5-9F39-1DB84806B4B8}"/>
+                <a16:creationId xmlns:a16="http://schemas.microsoft.com/office/drawing/2014/main" xmlns="" id="{32347B15-6181-42A5-9F39-1DB84806B4B8}"/>
               </a:ext>
             </a:extLst>
           </p:cNvPr>
@@ -3614,7 +3615,7 @@
           <p:cNvPr id="8" name="Picture 7" descr="A screenshot of a computer screen&#10;&#10;Description automatically generated">
             <a:extLst>
               <a:ext uri="{FF2B5EF4-FFF2-40B4-BE49-F238E27FC236}">
-                <a16:creationId xmlns:a16="http://schemas.microsoft.com/office/drawing/2014/main" id="{2993FA88-F75E-4831-99AD-0BE651234284}"/>
+                <a16:creationId xmlns:a16="http://schemas.microsoft.com/office/drawing/2014/main" xmlns="" id="{2993FA88-F75E-4831-99AD-0BE651234284}"/>
               </a:ext>
             </a:extLst>
           </p:cNvPr>
@@ -3649,7 +3650,7 @@
           <p:cNvPr id="9" name="TextBox 8">
             <a:extLst>
               <a:ext uri="{FF2B5EF4-FFF2-40B4-BE49-F238E27FC236}">
-                <a16:creationId xmlns:a16="http://schemas.microsoft.com/office/drawing/2014/main" id="{50AB53A2-58A8-458E-8224-D283665B18EB}"/>
+                <a16:creationId xmlns:a16="http://schemas.microsoft.com/office/drawing/2014/main" xmlns="" id="{50AB53A2-58A8-458E-8224-D283665B18EB}"/>
               </a:ext>
             </a:extLst>
           </p:cNvPr>
@@ -3754,7 +3755,7 @@
           <p:cNvPr id="2" name="TextBox 1">
             <a:extLst>
               <a:ext uri="{FF2B5EF4-FFF2-40B4-BE49-F238E27FC236}">
-                <a16:creationId xmlns:a16="http://schemas.microsoft.com/office/drawing/2014/main" id="{75BCD752-A870-44FF-815E-531D48A12F00}"/>
+                <a16:creationId xmlns:a16="http://schemas.microsoft.com/office/drawing/2014/main" xmlns="" id="{75BCD752-A870-44FF-815E-531D48A12F00}"/>
               </a:ext>
             </a:extLst>
           </p:cNvPr>
@@ -3792,7 +3793,7 @@
           <p:cNvPr id="7" name="Picture 6" descr="A screenshot of a computer screen&#10;&#10;Description automatically generated">
             <a:extLst>
               <a:ext uri="{FF2B5EF4-FFF2-40B4-BE49-F238E27FC236}">
-                <a16:creationId xmlns:a16="http://schemas.microsoft.com/office/drawing/2014/main" id="{32347B15-6181-42A5-9F39-1DB84806B4B8}"/>
+                <a16:creationId xmlns:a16="http://schemas.microsoft.com/office/drawing/2014/main" xmlns="" id="{32347B15-6181-42A5-9F39-1DB84806B4B8}"/>
               </a:ext>
             </a:extLst>
           </p:cNvPr>
@@ -3827,7 +3828,7 @@
           <p:cNvPr id="9" name="TextBox 8">
             <a:extLst>
               <a:ext uri="{FF2B5EF4-FFF2-40B4-BE49-F238E27FC236}">
-                <a16:creationId xmlns:a16="http://schemas.microsoft.com/office/drawing/2014/main" id="{50AB53A2-58A8-458E-8224-D283665B18EB}"/>
+                <a16:creationId xmlns:a16="http://schemas.microsoft.com/office/drawing/2014/main" xmlns="" id="{50AB53A2-58A8-458E-8224-D283665B18EB}"/>
               </a:ext>
             </a:extLst>
           </p:cNvPr>
@@ -3908,7 +3909,7 @@
           <p:cNvPr id="6" name="Picture 5" descr="A screenshot of a computer screen&#10;&#10;Description automatically generated">
             <a:extLst>
               <a:ext uri="{FF2B5EF4-FFF2-40B4-BE49-F238E27FC236}">
-                <a16:creationId xmlns:a16="http://schemas.microsoft.com/office/drawing/2014/main" id="{71FB2519-FF4E-4D4A-B07F-A108AF6E8DEE}"/>
+                <a16:creationId xmlns:a16="http://schemas.microsoft.com/office/drawing/2014/main" xmlns="" id="{71FB2519-FF4E-4D4A-B07F-A108AF6E8DEE}"/>
               </a:ext>
             </a:extLst>
           </p:cNvPr>
@@ -3973,7 +3974,7 @@
           <p:cNvPr id="2" name="TextBox 1">
             <a:extLst>
               <a:ext uri="{FF2B5EF4-FFF2-40B4-BE49-F238E27FC236}">
-                <a16:creationId xmlns:a16="http://schemas.microsoft.com/office/drawing/2014/main" id="{75BCD752-A870-44FF-815E-531D48A12F00}"/>
+                <a16:creationId xmlns:a16="http://schemas.microsoft.com/office/drawing/2014/main" xmlns="" id="{75BCD752-A870-44FF-815E-531D48A12F00}"/>
               </a:ext>
             </a:extLst>
           </p:cNvPr>
@@ -4011,7 +4012,7 @@
           <p:cNvPr id="7" name="Picture 6" descr="A screenshot of a computer screen&#10;&#10;Description automatically generated">
             <a:extLst>
               <a:ext uri="{FF2B5EF4-FFF2-40B4-BE49-F238E27FC236}">
-                <a16:creationId xmlns:a16="http://schemas.microsoft.com/office/drawing/2014/main" id="{32347B15-6181-42A5-9F39-1DB84806B4B8}"/>
+                <a16:creationId xmlns:a16="http://schemas.microsoft.com/office/drawing/2014/main" xmlns="" id="{32347B15-6181-42A5-9F39-1DB84806B4B8}"/>
               </a:ext>
             </a:extLst>
           </p:cNvPr>
@@ -4046,7 +4047,7 @@
           <p:cNvPr id="9" name="TextBox 8">
             <a:extLst>
               <a:ext uri="{FF2B5EF4-FFF2-40B4-BE49-F238E27FC236}">
-                <a16:creationId xmlns:a16="http://schemas.microsoft.com/office/drawing/2014/main" id="{50AB53A2-58A8-458E-8224-D283665B18EB}"/>
+                <a16:creationId xmlns:a16="http://schemas.microsoft.com/office/drawing/2014/main" xmlns="" id="{50AB53A2-58A8-458E-8224-D283665B18EB}"/>
               </a:ext>
             </a:extLst>
           </p:cNvPr>
@@ -4086,7 +4087,7 @@
           <p:cNvPr id="6" name="Picture 5" descr="A screenshot of a computer screen&#10;&#10;Description automatically generated">
             <a:extLst>
               <a:ext uri="{FF2B5EF4-FFF2-40B4-BE49-F238E27FC236}">
-                <a16:creationId xmlns:a16="http://schemas.microsoft.com/office/drawing/2014/main" id="{7F094520-9D29-439B-B947-D648DFDD8C64}"/>
+                <a16:creationId xmlns:a16="http://schemas.microsoft.com/office/drawing/2014/main" xmlns="" id="{7F094520-9D29-439B-B947-D648DFDD8C64}"/>
               </a:ext>
             </a:extLst>
           </p:cNvPr>
@@ -4151,7 +4152,7 @@
           <p:cNvPr id="2" name="TextBox 1">
             <a:extLst>
               <a:ext uri="{FF2B5EF4-FFF2-40B4-BE49-F238E27FC236}">
-                <a16:creationId xmlns:a16="http://schemas.microsoft.com/office/drawing/2014/main" id="{75BCD752-A870-44FF-815E-531D48A12F00}"/>
+                <a16:creationId xmlns:a16="http://schemas.microsoft.com/office/drawing/2014/main" xmlns="" id="{75BCD752-A870-44FF-815E-531D48A12F00}"/>
               </a:ext>
             </a:extLst>
           </p:cNvPr>
@@ -4161,14 +4162,14 @@
         <p:spPr>
           <a:xfrm>
             <a:off x="0" y="0"/>
-            <a:ext cx="8134066" cy="523220"/>
+            <a:ext cx="3144416" cy="954107"/>
           </a:xfrm>
           <a:prstGeom prst="rect">
             <a:avLst/>
           </a:prstGeom>
         </p:spPr>
         <p:txBody>
-          <a:bodyPr rtlCol="0">
+          <a:bodyPr wrap="square" rtlCol="0">
             <a:spAutoFit/>
           </a:bodyPr>
           <a:lstStyle/>
@@ -4179,11 +4180,157 @@
                   <a:srgbClr val="002060"/>
                 </a:solidFill>
               </a:rPr>
-              <a:t>Image of trace on whiteboard (will be posted later):</a:t>
-            </a:r>
-          </a:p>
-        </p:txBody>
-      </p:sp>
+              <a:t>Image of trace on </a:t>
+            </a:r>
+            <a:r>
+              <a:rPr lang="en-US" sz="2800" dirty="0" smtClean="0">
+                <a:solidFill>
+                  <a:srgbClr val="002060"/>
+                </a:solidFill>
+              </a:rPr>
+              <a:t>whiteboard:</a:t>
+            </a:r>
+            <a:endParaRPr lang="en-US" sz="2800" dirty="0">
+              <a:solidFill>
+                <a:srgbClr val="002060"/>
+              </a:solidFill>
+            </a:endParaRPr>
+          </a:p>
+        </p:txBody>
+      </p:sp>
+      <p:pic>
+        <p:nvPicPr>
+          <p:cNvPr id="3" name="Picture 2"/>
+          <p:cNvPicPr>
+            <a:picLocks noChangeAspect="1"/>
+          </p:cNvPicPr>
+          <p:nvPr/>
+        </p:nvPicPr>
+        <p:blipFill>
+          <a:blip r:embed="rId2" cstate="print">
+            <a:extLst>
+              <a:ext uri="{28A0092B-C50C-407E-A947-70E740481C1C}">
+                <a14:useLocalDpi xmlns:a14="http://schemas.microsoft.com/office/drawing/2010/main" val="0"/>
+              </a:ext>
+            </a:extLst>
+          </a:blip>
+          <a:stretch>
+            <a:fillRect/>
+          </a:stretch>
+        </p:blipFill>
+        <p:spPr>
+          <a:xfrm rot="5400000">
+            <a:off x="2827406" y="955690"/>
+            <a:ext cx="6675120" cy="5006340"/>
+          </a:xfrm>
+          <a:prstGeom prst="rect">
+            <a:avLst/>
+          </a:prstGeom>
+        </p:spPr>
+      </p:pic>
+    </p:spTree>
+    <p:extLst>
+      <p:ext uri="{BB962C8B-B14F-4D97-AF65-F5344CB8AC3E}">
+        <p14:creationId xmlns:p14="http://schemas.microsoft.com/office/powerpoint/2010/main" val="2059942418"/>
+      </p:ext>
+    </p:extLst>
+  </p:cSld>
+  <p:clrMapOvr>
+    <a:masterClrMapping/>
+  </p:clrMapOvr>
+</p:sld>
+</file>
+
+<file path=ppt/slides/slide6.xml><?xml version="1.0" encoding="utf-8"?>
+<p:sld xmlns:a="http://schemas.openxmlformats.org/drawingml/2006/main" xmlns:r="http://schemas.openxmlformats.org/officeDocument/2006/relationships" xmlns:p="http://schemas.openxmlformats.org/presentationml/2006/main">
+  <p:cSld>
+    <p:spTree>
+      <p:nvGrpSpPr>
+        <p:cNvPr id="1" name=""/>
+        <p:cNvGrpSpPr/>
+        <p:nvPr/>
+      </p:nvGrpSpPr>
+      <p:grpSpPr>
+        <a:xfrm>
+          <a:off x="0" y="0"/>
+          <a:ext cx="0" cy="0"/>
+          <a:chOff x="0" y="0"/>
+          <a:chExt cx="0" cy="0"/>
+        </a:xfrm>
+      </p:grpSpPr>
+      <p:sp>
+        <p:nvSpPr>
+          <p:cNvPr id="2" name="TextBox 1">
+            <a:extLst>
+              <a:ext uri="{FF2B5EF4-FFF2-40B4-BE49-F238E27FC236}">
+                <a16:creationId xmlns:a16="http://schemas.microsoft.com/office/drawing/2014/main" xmlns="" id="{75BCD752-A870-44FF-815E-531D48A12F00}"/>
+              </a:ext>
+            </a:extLst>
+          </p:cNvPr>
+          <p:cNvSpPr txBox="1"/>
+          <p:nvPr/>
+        </p:nvSpPr>
+        <p:spPr>
+          <a:xfrm>
+            <a:off x="-1" y="0"/>
+            <a:ext cx="4861249" cy="523220"/>
+          </a:xfrm>
+          <a:prstGeom prst="rect">
+            <a:avLst/>
+          </a:prstGeom>
+        </p:spPr>
+        <p:txBody>
+          <a:bodyPr wrap="square" rtlCol="0">
+            <a:spAutoFit/>
+          </a:bodyPr>
+          <a:lstStyle/>
+          <a:p>
+            <a:r>
+              <a:rPr lang="en-US" sz="2800" dirty="0" smtClean="0">
+                <a:solidFill>
+                  <a:srgbClr val="002060"/>
+                </a:solidFill>
+              </a:rPr>
+              <a:t>Same, for mystery4():</a:t>
+            </a:r>
+            <a:endParaRPr lang="en-US" sz="2800" dirty="0">
+              <a:solidFill>
+                <a:srgbClr val="002060"/>
+              </a:solidFill>
+            </a:endParaRPr>
+          </a:p>
+        </p:txBody>
+      </p:sp>
+      <p:pic>
+        <p:nvPicPr>
+          <p:cNvPr id="4" name="Picture 3"/>
+          <p:cNvPicPr>
+            <a:picLocks noChangeAspect="1"/>
+          </p:cNvPicPr>
+          <p:nvPr/>
+        </p:nvPicPr>
+        <p:blipFill>
+          <a:blip r:embed="rId2" cstate="print">
+            <a:extLst>
+              <a:ext uri="{28A0092B-C50C-407E-A947-70E740481C1C}">
+                <a14:useLocalDpi xmlns:a14="http://schemas.microsoft.com/office/drawing/2010/main" val="0"/>
+              </a:ext>
+            </a:extLst>
+          </a:blip>
+          <a:stretch>
+            <a:fillRect/>
+          </a:stretch>
+        </p:blipFill>
+        <p:spPr>
+          <a:xfrm>
+            <a:off x="345232" y="608874"/>
+            <a:ext cx="7223760" cy="5417820"/>
+          </a:xfrm>
+          <a:prstGeom prst="rect">
+            <a:avLst/>
+          </a:prstGeom>
+        </p:spPr>
+      </p:pic>
     </p:spTree>
     <p:extLst>
       <p:ext uri="{BB962C8B-B14F-4D97-AF65-F5344CB8AC3E}">

</xml_diff>